<commit_message>
Update slides from set operations to fix typos
Signed-off-by: Charlie Murphy <tcm3@cs.princeton.edu>
</commit_message>
<xml_diff>
--- a/courses/csci246/spring26/slides/02_11_26_set_operations.pptx
+++ b/courses/csci246/spring26/slides/02_11_26_set_operations.pptx
@@ -215,7 +215,7 @@
           <a:p>
             <a:fld id="{B7930911-D214-D045-9349-C37725674895}" type="datetimeFigureOut">
               <a:rPr lang="en-US" smtClean="0"/>
-              <a:t>2/10/2026</a:t>
+              <a:t>2/11/26</a:t>
             </a:fld>
             <a:endParaRPr lang="en-US"/>
           </a:p>
@@ -482,6 +482,90 @@
 </p:notesMaster>
 </file>
 
+<file path=ppt/notesSlides/notesSlide1.xml><?xml version="1.0" encoding="utf-8"?>
+<p:notes xmlns:a="http://schemas.openxmlformats.org/drawingml/2006/main" xmlns:r="http://schemas.openxmlformats.org/officeDocument/2006/relationships" xmlns:p="http://schemas.openxmlformats.org/presentationml/2006/main">
+  <p:cSld>
+    <p:spTree>
+      <p:nvGrpSpPr>
+        <p:cNvPr id="1" name=""/>
+        <p:cNvGrpSpPr/>
+        <p:nvPr/>
+      </p:nvGrpSpPr>
+      <p:grpSpPr>
+        <a:xfrm>
+          <a:off x="0" y="0"/>
+          <a:ext cx="0" cy="0"/>
+          <a:chOff x="0" y="0"/>
+          <a:chExt cx="0" cy="0"/>
+        </a:xfrm>
+      </p:grpSpPr>
+      <p:sp>
+        <p:nvSpPr>
+          <p:cNvPr id="2" name="Slide Image Placeholder 1"/>
+          <p:cNvSpPr>
+            <a:spLocks noGrp="1" noRot="1" noChangeAspect="1"/>
+          </p:cNvSpPr>
+          <p:nvPr>
+            <p:ph type="sldImg"/>
+          </p:nvPr>
+        </p:nvSpPr>
+        <p:spPr/>
+      </p:sp>
+      <p:sp>
+        <p:nvSpPr>
+          <p:cNvPr id="3" name="Notes Placeholder 2"/>
+          <p:cNvSpPr>
+            <a:spLocks noGrp="1"/>
+          </p:cNvSpPr>
+          <p:nvPr>
+            <p:ph type="body" idx="1"/>
+          </p:nvPr>
+        </p:nvSpPr>
+        <p:spPr/>
+        <p:txBody>
+          <a:bodyPr/>
+          <a:lstStyle/>
+          <a:p>
+            <a:endParaRPr lang="en-US" dirty="0"/>
+          </a:p>
+        </p:txBody>
+      </p:sp>
+      <p:sp>
+        <p:nvSpPr>
+          <p:cNvPr id="4" name="Slide Number Placeholder 3"/>
+          <p:cNvSpPr>
+            <a:spLocks noGrp="1"/>
+          </p:cNvSpPr>
+          <p:nvPr>
+            <p:ph type="sldNum" sz="quarter" idx="5"/>
+          </p:nvPr>
+        </p:nvSpPr>
+        <p:spPr/>
+        <p:txBody>
+          <a:bodyPr/>
+          <a:lstStyle/>
+          <a:p>
+            <a:fld id="{A72961A4-95F2-894E-ADC5-DD1F6E908F08}" type="slidenum">
+              <a:rPr lang="en-US" smtClean="0"/>
+              <a:t>1</a:t>
+            </a:fld>
+            <a:endParaRPr lang="en-US"/>
+          </a:p>
+        </p:txBody>
+      </p:sp>
+    </p:spTree>
+    <p:extLst>
+      <p:ext uri="{BB962C8B-B14F-4D97-AF65-F5344CB8AC3E}">
+        <p14:creationId xmlns:p14="http://schemas.microsoft.com/office/powerpoint/2010/main" val="982491226"/>
+      </p:ext>
+    </p:extLst>
+  </p:cSld>
+  <p:clrMapOvr>
+    <a:masterClrMapping/>
+  </p:clrMapOvr>
+</p:notes>
+</file>
+
 <file path=ppt/slideLayouts/slideLayout1.xml><?xml version="1.0" encoding="utf-8"?>
 <p:sldLayout xmlns:a="http://schemas.openxmlformats.org/drawingml/2006/main" xmlns:r="http://schemas.openxmlformats.org/officeDocument/2006/relationships" xmlns:p="http://schemas.openxmlformats.org/presentationml/2006/main" type="title" preserve="1">
   <p:cSld name="Title Slide">
@@ -629,7 +713,7 @@
           <a:p>
             <a:fld id="{05900130-2E42-9F4E-B9EA-739EF1E7DBD9}" type="datetimeFigureOut">
               <a:rPr lang="en-US" smtClean="0"/>
-              <a:t>2/10/2026</a:t>
+              <a:t>2/11/26</a:t>
             </a:fld>
             <a:endParaRPr lang="en-US"/>
           </a:p>
@@ -827,7 +911,7 @@
           <a:p>
             <a:fld id="{05900130-2E42-9F4E-B9EA-739EF1E7DBD9}" type="datetimeFigureOut">
               <a:rPr lang="en-US" smtClean="0"/>
-              <a:t>2/10/2026</a:t>
+              <a:t>2/11/26</a:t>
             </a:fld>
             <a:endParaRPr lang="en-US"/>
           </a:p>
@@ -1035,7 +1119,7 @@
           <a:p>
             <a:fld id="{05900130-2E42-9F4E-B9EA-739EF1E7DBD9}" type="datetimeFigureOut">
               <a:rPr lang="en-US" smtClean="0"/>
-              <a:t>2/10/2026</a:t>
+              <a:t>2/11/26</a:t>
             </a:fld>
             <a:endParaRPr lang="en-US"/>
           </a:p>
@@ -1233,7 +1317,7 @@
           <a:p>
             <a:fld id="{05900130-2E42-9F4E-B9EA-739EF1E7DBD9}" type="datetimeFigureOut">
               <a:rPr lang="en-US" smtClean="0"/>
-              <a:t>2/10/2026</a:t>
+              <a:t>2/11/26</a:t>
             </a:fld>
             <a:endParaRPr lang="en-US"/>
           </a:p>
@@ -1508,7 +1592,7 @@
           <a:p>
             <a:fld id="{05900130-2E42-9F4E-B9EA-739EF1E7DBD9}" type="datetimeFigureOut">
               <a:rPr lang="en-US" smtClean="0"/>
-              <a:t>2/10/2026</a:t>
+              <a:t>2/11/26</a:t>
             </a:fld>
             <a:endParaRPr lang="en-US"/>
           </a:p>
@@ -1773,7 +1857,7 @@
           <a:p>
             <a:fld id="{05900130-2E42-9F4E-B9EA-739EF1E7DBD9}" type="datetimeFigureOut">
               <a:rPr lang="en-US" smtClean="0"/>
-              <a:t>2/10/2026</a:t>
+              <a:t>2/11/26</a:t>
             </a:fld>
             <a:endParaRPr lang="en-US"/>
           </a:p>
@@ -2185,7 +2269,7 @@
           <a:p>
             <a:fld id="{05900130-2E42-9F4E-B9EA-739EF1E7DBD9}" type="datetimeFigureOut">
               <a:rPr lang="en-US" smtClean="0"/>
-              <a:t>2/10/2026</a:t>
+              <a:t>2/11/26</a:t>
             </a:fld>
             <a:endParaRPr lang="en-US"/>
           </a:p>
@@ -2326,7 +2410,7 @@
           <a:p>
             <a:fld id="{05900130-2E42-9F4E-B9EA-739EF1E7DBD9}" type="datetimeFigureOut">
               <a:rPr lang="en-US" smtClean="0"/>
-              <a:t>2/10/2026</a:t>
+              <a:t>2/11/26</a:t>
             </a:fld>
             <a:endParaRPr lang="en-US"/>
           </a:p>
@@ -2439,7 +2523,7 @@
           <a:p>
             <a:fld id="{05900130-2E42-9F4E-B9EA-739EF1E7DBD9}" type="datetimeFigureOut">
               <a:rPr lang="en-US" smtClean="0"/>
-              <a:t>2/10/2026</a:t>
+              <a:t>2/11/26</a:t>
             </a:fld>
             <a:endParaRPr lang="en-US"/>
           </a:p>
@@ -2750,7 +2834,7 @@
           <a:p>
             <a:fld id="{05900130-2E42-9F4E-B9EA-739EF1E7DBD9}" type="datetimeFigureOut">
               <a:rPr lang="en-US" smtClean="0"/>
-              <a:t>2/10/2026</a:t>
+              <a:t>2/11/26</a:t>
             </a:fld>
             <a:endParaRPr lang="en-US"/>
           </a:p>
@@ -3038,7 +3122,7 @@
           <a:p>
             <a:fld id="{05900130-2E42-9F4E-B9EA-739EF1E7DBD9}" type="datetimeFigureOut">
               <a:rPr lang="en-US" smtClean="0"/>
-              <a:t>2/10/2026</a:t>
+              <a:t>2/11/26</a:t>
             </a:fld>
             <a:endParaRPr lang="en-US"/>
           </a:p>
@@ -3279,7 +3363,7 @@
           <a:p>
             <a:fld id="{05900130-2E42-9F4E-B9EA-739EF1E7DBD9}" type="datetimeFigureOut">
               <a:rPr lang="en-US" smtClean="0"/>
-              <a:t>2/10/2026</a:t>
+              <a:t>2/11/26</a:t>
             </a:fld>
             <a:endParaRPr lang="en-US"/>
           </a:p>
@@ -3904,8 +3988,8 @@
           </a:p>
         </p:txBody>
       </p:sp>
-      <mc:AlternateContent xmlns:mc="http://schemas.openxmlformats.org/markup-compatibility/2006">
-        <mc:Choice xmlns:a14="http://schemas.microsoft.com/office/drawing/2010/main" Requires="a14">
+      <mc:AlternateContent xmlns:mc="http://schemas.openxmlformats.org/markup-compatibility/2006" xmlns:a14="http://schemas.microsoft.com/office/drawing/2010/main">
+        <mc:Choice Requires="a14">
           <p:sp>
             <p:nvSpPr>
               <p:cNvPr id="3" name="Content Placeholder 2">
@@ -4222,7 +4306,7 @@
             </p:txBody>
           </p:sp>
         </mc:Choice>
-        <mc:Fallback>
+        <mc:Fallback xmlns="">
           <p:sp>
             <p:nvSpPr>
               <p:cNvPr id="3" name="Content Placeholder 2">
@@ -4323,8 +4407,8 @@
           </a:p>
         </p:txBody>
       </p:sp>
-      <mc:AlternateContent xmlns:mc="http://schemas.openxmlformats.org/markup-compatibility/2006">
-        <mc:Choice xmlns:a14="http://schemas.microsoft.com/office/drawing/2010/main" Requires="a14">
+      <mc:AlternateContent xmlns:mc="http://schemas.openxmlformats.org/markup-compatibility/2006" xmlns:a14="http://schemas.microsoft.com/office/drawing/2010/main">
+        <mc:Choice Requires="a14">
           <p:sp>
             <p:nvSpPr>
               <p:cNvPr id="3" name="Content Placeholder 2">
@@ -4620,7 +4704,7 @@
             </p:txBody>
           </p:sp>
         </mc:Choice>
-        <mc:Fallback>
+        <mc:Fallback xmlns="">
           <p:sp>
             <p:nvSpPr>
               <p:cNvPr id="3" name="Content Placeholder 2">
@@ -4664,8 +4748,8 @@
           </p:sp>
         </mc:Fallback>
       </mc:AlternateContent>
-      <mc:AlternateContent xmlns:mc="http://schemas.openxmlformats.org/markup-compatibility/2006">
-        <mc:Choice xmlns:a14="http://schemas.microsoft.com/office/drawing/2010/main" Requires="a14">
+      <mc:AlternateContent xmlns:mc="http://schemas.openxmlformats.org/markup-compatibility/2006" xmlns:a14="http://schemas.microsoft.com/office/drawing/2010/main">
+        <mc:Choice Requires="a14">
           <p:sp>
             <p:nvSpPr>
               <p:cNvPr id="4" name="TextBox 3">
@@ -4694,6 +4778,7 @@
               </a:bodyPr>
               <a:lstStyle/>
               <a:p>
+                <a:pPr/>
                 <a14:m>
                   <m:oMathPara xmlns:m="http://schemas.openxmlformats.org/officeDocument/2006/math">
                     <m:oMathParaPr>
@@ -4732,7 +4817,7 @@
             </p:txBody>
           </p:sp>
         </mc:Choice>
-        <mc:Fallback>
+        <mc:Fallback xmlns="">
           <p:sp>
             <p:nvSpPr>
               <p:cNvPr id="4" name="TextBox 3">
@@ -4777,8 +4862,8 @@
           </p:sp>
         </mc:Fallback>
       </mc:AlternateContent>
-      <mc:AlternateContent xmlns:mc="http://schemas.openxmlformats.org/markup-compatibility/2006">
-        <mc:Choice xmlns:a14="http://schemas.microsoft.com/office/drawing/2010/main" Requires="a14">
+      <mc:AlternateContent xmlns:mc="http://schemas.openxmlformats.org/markup-compatibility/2006" xmlns:a14="http://schemas.microsoft.com/office/drawing/2010/main">
+        <mc:Choice Requires="a14">
           <p:sp>
             <p:nvSpPr>
               <p:cNvPr id="5" name="TextBox 4">
@@ -4807,6 +4892,7 @@
               </a:bodyPr>
               <a:lstStyle/>
               <a:p>
+                <a:pPr/>
                 <a14:m>
                   <m:oMathPara xmlns:m="http://schemas.openxmlformats.org/officeDocument/2006/math">
                     <m:oMathParaPr>
@@ -4839,7 +4925,7 @@
             </p:txBody>
           </p:sp>
         </mc:Choice>
-        <mc:Fallback>
+        <mc:Fallback xmlns="">
           <p:sp>
             <p:nvSpPr>
               <p:cNvPr id="5" name="TextBox 4">
@@ -4884,8 +4970,8 @@
           </p:sp>
         </mc:Fallback>
       </mc:AlternateContent>
-      <mc:AlternateContent xmlns:mc="http://schemas.openxmlformats.org/markup-compatibility/2006">
-        <mc:Choice xmlns:a14="http://schemas.microsoft.com/office/drawing/2010/main" Requires="a14">
+      <mc:AlternateContent xmlns:mc="http://schemas.openxmlformats.org/markup-compatibility/2006" xmlns:a14="http://schemas.microsoft.com/office/drawing/2010/main">
+        <mc:Choice Requires="a14">
           <p:sp>
             <p:nvSpPr>
               <p:cNvPr id="6" name="TextBox 5">
@@ -4914,6 +5000,7 @@
               </a:bodyPr>
               <a:lstStyle/>
               <a:p>
+                <a:pPr/>
                 <a14:m>
                   <m:oMathPara xmlns:m="http://schemas.openxmlformats.org/officeDocument/2006/math">
                     <m:oMathParaPr>
@@ -4997,7 +5084,7 @@
             </p:txBody>
           </p:sp>
         </mc:Choice>
-        <mc:Fallback>
+        <mc:Fallback xmlns="">
           <p:sp>
             <p:nvSpPr>
               <p:cNvPr id="6" name="TextBox 5">
@@ -5042,8 +5129,8 @@
           </p:sp>
         </mc:Fallback>
       </mc:AlternateContent>
-      <mc:AlternateContent xmlns:mc="http://schemas.openxmlformats.org/markup-compatibility/2006">
-        <mc:Choice xmlns:a14="http://schemas.microsoft.com/office/drawing/2010/main" Requires="a14">
+      <mc:AlternateContent xmlns:mc="http://schemas.openxmlformats.org/markup-compatibility/2006" xmlns:a14="http://schemas.microsoft.com/office/drawing/2010/main">
+        <mc:Choice Requires="a14">
           <p:sp>
             <p:nvSpPr>
               <p:cNvPr id="7" name="TextBox 6">
@@ -5072,6 +5159,7 @@
               </a:bodyPr>
               <a:lstStyle/>
               <a:p>
+                <a:pPr/>
                 <a14:m>
                   <m:oMathPara xmlns:m="http://schemas.openxmlformats.org/officeDocument/2006/math">
                     <m:oMathParaPr>
@@ -5155,7 +5243,7 @@
             </p:txBody>
           </p:sp>
         </mc:Choice>
-        <mc:Fallback>
+        <mc:Fallback xmlns="">
           <p:sp>
             <p:nvSpPr>
               <p:cNvPr id="7" name="TextBox 6">
@@ -5465,8 +5553,8 @@
           </a:p>
         </p:txBody>
       </p:sp>
-      <mc:AlternateContent xmlns:mc="http://schemas.openxmlformats.org/markup-compatibility/2006">
-        <mc:Choice xmlns:a14="http://schemas.microsoft.com/office/drawing/2010/main" Requires="a14">
+      <mc:AlternateContent xmlns:mc="http://schemas.openxmlformats.org/markup-compatibility/2006" xmlns:a14="http://schemas.microsoft.com/office/drawing/2010/main">
+        <mc:Choice Requires="a14">
           <p:sp>
             <p:nvSpPr>
               <p:cNvPr id="10" name="Oval 9">
@@ -5536,11 +5624,12 @@
                     </m:oMath>
                   </m:oMathPara>
                 </a14:m>
+                <a:endParaRPr/>
               </a:p>
             </p:txBody>
           </p:sp>
         </mc:Choice>
-        <mc:Fallback>
+        <mc:Fallback xmlns="">
           <p:sp>
             <p:nvSpPr>
               <p:cNvPr id="10" name="Oval 9">
@@ -5593,8 +5682,8 @@
           </p:sp>
         </mc:Fallback>
       </mc:AlternateContent>
-      <mc:AlternateContent xmlns:mc="http://schemas.openxmlformats.org/markup-compatibility/2006">
-        <mc:Choice xmlns:a14="http://schemas.microsoft.com/office/drawing/2010/main" Requires="a14">
+      <mc:AlternateContent xmlns:mc="http://schemas.openxmlformats.org/markup-compatibility/2006" xmlns:a14="http://schemas.microsoft.com/office/drawing/2010/main">
+        <mc:Choice Requires="a14">
           <p:sp>
             <p:nvSpPr>
               <p:cNvPr id="11" name="Oval 10">
@@ -5664,11 +5753,12 @@
                     </m:oMath>
                   </m:oMathPara>
                 </a14:m>
+                <a:endParaRPr/>
               </a:p>
             </p:txBody>
           </p:sp>
         </mc:Choice>
-        <mc:Fallback>
+        <mc:Fallback xmlns="">
           <p:sp>
             <p:nvSpPr>
               <p:cNvPr id="11" name="Oval 10">
@@ -5721,8 +5811,8 @@
           </p:sp>
         </mc:Fallback>
       </mc:AlternateContent>
-      <mc:AlternateContent xmlns:mc="http://schemas.openxmlformats.org/markup-compatibility/2006">
-        <mc:Choice xmlns:a14="http://schemas.microsoft.com/office/drawing/2010/main" Requires="a14">
+      <mc:AlternateContent xmlns:mc="http://schemas.openxmlformats.org/markup-compatibility/2006" xmlns:a14="http://schemas.microsoft.com/office/drawing/2010/main">
+        <mc:Choice Requires="a14">
           <p:sp>
             <p:nvSpPr>
               <p:cNvPr id="13" name="Oval 12">
@@ -5797,11 +5887,12 @@
                     </m:oMath>
                   </m:oMathPara>
                 </a14:m>
+                <a:endParaRPr/>
               </a:p>
             </p:txBody>
           </p:sp>
         </mc:Choice>
-        <mc:Fallback>
+        <mc:Fallback xmlns="">
           <p:sp>
             <p:nvSpPr>
               <p:cNvPr id="13" name="Oval 12">
@@ -5854,8 +5945,8 @@
           </p:sp>
         </mc:Fallback>
       </mc:AlternateContent>
-      <mc:AlternateContent xmlns:mc="http://schemas.openxmlformats.org/markup-compatibility/2006">
-        <mc:Choice xmlns:a14="http://schemas.microsoft.com/office/drawing/2010/main" Requires="a14">
+      <mc:AlternateContent xmlns:mc="http://schemas.openxmlformats.org/markup-compatibility/2006" xmlns:a14="http://schemas.microsoft.com/office/drawing/2010/main">
+        <mc:Choice Requires="a14">
           <p:sp>
             <p:nvSpPr>
               <p:cNvPr id="14" name="Oval 13">
@@ -5927,11 +6018,12 @@
                     </m:oMath>
                   </m:oMathPara>
                 </a14:m>
+                <a:endParaRPr/>
               </a:p>
             </p:txBody>
           </p:sp>
         </mc:Choice>
-        <mc:Fallback>
+        <mc:Fallback xmlns="">
           <p:sp>
             <p:nvSpPr>
               <p:cNvPr id="14" name="Oval 13">
@@ -5984,8 +6076,8 @@
           </p:sp>
         </mc:Fallback>
       </mc:AlternateContent>
-      <mc:AlternateContent xmlns:mc="http://schemas.openxmlformats.org/markup-compatibility/2006">
-        <mc:Choice xmlns:a14="http://schemas.microsoft.com/office/drawing/2010/main" Requires="a14">
+      <mc:AlternateContent xmlns:mc="http://schemas.openxmlformats.org/markup-compatibility/2006" xmlns:a14="http://schemas.microsoft.com/office/drawing/2010/main">
+        <mc:Choice Requires="a14">
           <p:sp>
             <p:nvSpPr>
               <p:cNvPr id="15" name="Oval 14">
@@ -6055,11 +6147,12 @@
                     </m:oMath>
                   </m:oMathPara>
                 </a14:m>
+                <a:endParaRPr/>
               </a:p>
             </p:txBody>
           </p:sp>
         </mc:Choice>
-        <mc:Fallback>
+        <mc:Fallback xmlns="">
           <p:sp>
             <p:nvSpPr>
               <p:cNvPr id="15" name="Oval 14">
@@ -6313,8 +6406,8 @@
           </a:p>
         </p:txBody>
       </p:sp>
-      <mc:AlternateContent xmlns:mc="http://schemas.openxmlformats.org/markup-compatibility/2006">
-        <mc:Choice xmlns:a14="http://schemas.microsoft.com/office/drawing/2010/main" Requires="a14">
+      <mc:AlternateContent xmlns:mc="http://schemas.openxmlformats.org/markup-compatibility/2006" xmlns:a14="http://schemas.microsoft.com/office/drawing/2010/main">
+        <mc:Choice Requires="a14">
           <p:sp>
             <p:nvSpPr>
               <p:cNvPr id="3" name="Content Placeholder 2">
@@ -6746,7 +6839,7 @@
             </p:txBody>
           </p:sp>
         </mc:Choice>
-        <mc:Fallback>
+        <mc:Fallback xmlns="">
           <p:sp>
             <p:nvSpPr>
               <p:cNvPr id="3" name="Content Placeholder 2">
@@ -6857,8 +6950,8 @@
           </a:p>
         </p:txBody>
       </p:sp>
-      <mc:AlternateContent xmlns:mc="http://schemas.openxmlformats.org/markup-compatibility/2006">
-        <mc:Choice xmlns:a14="http://schemas.microsoft.com/office/drawing/2010/main" Requires="a14">
+      <mc:AlternateContent xmlns:mc="http://schemas.openxmlformats.org/markup-compatibility/2006" xmlns:a14="http://schemas.microsoft.com/office/drawing/2010/main">
+        <mc:Choice Requires="a14">
           <p:sp>
             <p:nvSpPr>
               <p:cNvPr id="3" name="Content Placeholder 2">
@@ -7155,7 +7248,7 @@
             </p:txBody>
           </p:sp>
         </mc:Choice>
-        <mc:Fallback>
+        <mc:Fallback xmlns="">
           <p:sp>
             <p:nvSpPr>
               <p:cNvPr id="3" name="Content Placeholder 2">
@@ -7199,8 +7292,8 @@
           </p:sp>
         </mc:Fallback>
       </mc:AlternateContent>
-      <mc:AlternateContent xmlns:mc="http://schemas.openxmlformats.org/markup-compatibility/2006">
-        <mc:Choice xmlns:a14="http://schemas.microsoft.com/office/drawing/2010/main" Requires="a14">
+      <mc:AlternateContent xmlns:mc="http://schemas.openxmlformats.org/markup-compatibility/2006" xmlns:a14="http://schemas.microsoft.com/office/drawing/2010/main">
+        <mc:Choice Requires="a14">
           <p:sp>
             <p:nvSpPr>
               <p:cNvPr id="8" name="TextBox 7">
@@ -7229,6 +7322,7 @@
               </a:bodyPr>
               <a:lstStyle/>
               <a:p>
+                <a:pPr/>
                 <a14:m>
                   <m:oMathPara xmlns:m="http://schemas.openxmlformats.org/officeDocument/2006/math">
                     <m:oMathParaPr>
@@ -7267,7 +7361,7 @@
             </p:txBody>
           </p:sp>
         </mc:Choice>
-        <mc:Fallback>
+        <mc:Fallback xmlns="">
           <p:sp>
             <p:nvSpPr>
               <p:cNvPr id="8" name="TextBox 7">
@@ -7312,8 +7406,8 @@
           </p:sp>
         </mc:Fallback>
       </mc:AlternateContent>
-      <mc:AlternateContent xmlns:mc="http://schemas.openxmlformats.org/markup-compatibility/2006">
-        <mc:Choice xmlns:a14="http://schemas.microsoft.com/office/drawing/2010/main" Requires="a14">
+      <mc:AlternateContent xmlns:mc="http://schemas.openxmlformats.org/markup-compatibility/2006" xmlns:a14="http://schemas.microsoft.com/office/drawing/2010/main">
+        <mc:Choice Requires="a14">
           <p:sp>
             <p:nvSpPr>
               <p:cNvPr id="9" name="TextBox 8">
@@ -7342,6 +7436,7 @@
               </a:bodyPr>
               <a:lstStyle/>
               <a:p>
+                <a:pPr/>
                 <a14:m>
                   <m:oMathPara xmlns:m="http://schemas.openxmlformats.org/officeDocument/2006/math">
                     <m:oMathParaPr>
@@ -7374,7 +7469,7 @@
             </p:txBody>
           </p:sp>
         </mc:Choice>
-        <mc:Fallback>
+        <mc:Fallback xmlns="">
           <p:sp>
             <p:nvSpPr>
               <p:cNvPr id="9" name="TextBox 8">
@@ -7419,8 +7514,8 @@
           </p:sp>
         </mc:Fallback>
       </mc:AlternateContent>
-      <mc:AlternateContent xmlns:mc="http://schemas.openxmlformats.org/markup-compatibility/2006">
-        <mc:Choice xmlns:a14="http://schemas.microsoft.com/office/drawing/2010/main" Requires="a14">
+      <mc:AlternateContent xmlns:mc="http://schemas.openxmlformats.org/markup-compatibility/2006" xmlns:a14="http://schemas.microsoft.com/office/drawing/2010/main">
+        <mc:Choice Requires="a14">
           <p:sp>
             <p:nvSpPr>
               <p:cNvPr id="10" name="TextBox 9">
@@ -7449,6 +7544,7 @@
               </a:bodyPr>
               <a:lstStyle/>
               <a:p>
+                <a:pPr/>
                 <a14:m>
                   <m:oMathPara xmlns:m="http://schemas.openxmlformats.org/officeDocument/2006/math">
                     <m:oMathParaPr>
@@ -7532,7 +7628,7 @@
             </p:txBody>
           </p:sp>
         </mc:Choice>
-        <mc:Fallback>
+        <mc:Fallback xmlns="">
           <p:sp>
             <p:nvSpPr>
               <p:cNvPr id="10" name="TextBox 9">
@@ -7577,8 +7673,8 @@
           </p:sp>
         </mc:Fallback>
       </mc:AlternateContent>
-      <mc:AlternateContent xmlns:mc="http://schemas.openxmlformats.org/markup-compatibility/2006">
-        <mc:Choice xmlns:a14="http://schemas.microsoft.com/office/drawing/2010/main" Requires="a14">
+      <mc:AlternateContent xmlns:mc="http://schemas.openxmlformats.org/markup-compatibility/2006" xmlns:a14="http://schemas.microsoft.com/office/drawing/2010/main">
+        <mc:Choice Requires="a14">
           <p:sp>
             <p:nvSpPr>
               <p:cNvPr id="11" name="TextBox 10">
@@ -7607,6 +7703,7 @@
               </a:bodyPr>
               <a:lstStyle/>
               <a:p>
+                <a:pPr/>
                 <a14:m>
                   <m:oMathPara xmlns:m="http://schemas.openxmlformats.org/officeDocument/2006/math">
                     <m:oMathParaPr>
@@ -7690,7 +7787,7 @@
             </p:txBody>
           </p:sp>
         </mc:Choice>
-        <mc:Fallback>
+        <mc:Fallback xmlns="">
           <p:sp>
             <p:nvSpPr>
               <p:cNvPr id="11" name="TextBox 10">
@@ -8000,8 +8097,8 @@
           </a:p>
         </p:txBody>
       </p:sp>
-      <mc:AlternateContent xmlns:mc="http://schemas.openxmlformats.org/markup-compatibility/2006">
-        <mc:Choice xmlns:a14="http://schemas.microsoft.com/office/drawing/2010/main" Requires="a14">
+      <mc:AlternateContent xmlns:mc="http://schemas.openxmlformats.org/markup-compatibility/2006" xmlns:a14="http://schemas.microsoft.com/office/drawing/2010/main">
+        <mc:Choice Requires="a14">
           <p:sp>
             <p:nvSpPr>
               <p:cNvPr id="6" name="Oval 5">
@@ -8071,11 +8168,12 @@
                     </m:oMath>
                   </m:oMathPara>
                 </a14:m>
+                <a:endParaRPr/>
               </a:p>
             </p:txBody>
           </p:sp>
         </mc:Choice>
-        <mc:Fallback>
+        <mc:Fallback xmlns="">
           <p:sp>
             <p:nvSpPr>
               <p:cNvPr id="6" name="Oval 5">
@@ -8128,8 +8226,8 @@
           </p:sp>
         </mc:Fallback>
       </mc:AlternateContent>
-      <mc:AlternateContent xmlns:mc="http://schemas.openxmlformats.org/markup-compatibility/2006">
-        <mc:Choice xmlns:a14="http://schemas.microsoft.com/office/drawing/2010/main" Requires="a14">
+      <mc:AlternateContent xmlns:mc="http://schemas.openxmlformats.org/markup-compatibility/2006" xmlns:a14="http://schemas.microsoft.com/office/drawing/2010/main">
+        <mc:Choice Requires="a14">
           <p:sp>
             <p:nvSpPr>
               <p:cNvPr id="7" name="Oval 6">
@@ -8199,11 +8297,12 @@
                     </m:oMath>
                   </m:oMathPara>
                 </a14:m>
+                <a:endParaRPr/>
               </a:p>
             </p:txBody>
           </p:sp>
         </mc:Choice>
-        <mc:Fallback>
+        <mc:Fallback xmlns="">
           <p:sp>
             <p:nvSpPr>
               <p:cNvPr id="7" name="Oval 6">
@@ -8256,8 +8355,8 @@
           </p:sp>
         </mc:Fallback>
       </mc:AlternateContent>
-      <mc:AlternateContent xmlns:mc="http://schemas.openxmlformats.org/markup-compatibility/2006">
-        <mc:Choice xmlns:a14="http://schemas.microsoft.com/office/drawing/2010/main" Requires="a14">
+      <mc:AlternateContent xmlns:mc="http://schemas.openxmlformats.org/markup-compatibility/2006" xmlns:a14="http://schemas.microsoft.com/office/drawing/2010/main">
+        <mc:Choice Requires="a14">
           <p:sp>
             <p:nvSpPr>
               <p:cNvPr id="17" name="Oval 16">
@@ -8332,11 +8431,12 @@
                     </m:oMath>
                   </m:oMathPara>
                 </a14:m>
+                <a:endParaRPr/>
               </a:p>
             </p:txBody>
           </p:sp>
         </mc:Choice>
-        <mc:Fallback>
+        <mc:Fallback xmlns="">
           <p:sp>
             <p:nvSpPr>
               <p:cNvPr id="17" name="Oval 16">
@@ -8389,8 +8489,8 @@
           </p:sp>
         </mc:Fallback>
       </mc:AlternateContent>
-      <mc:AlternateContent xmlns:mc="http://schemas.openxmlformats.org/markup-compatibility/2006">
-        <mc:Choice xmlns:a14="http://schemas.microsoft.com/office/drawing/2010/main" Requires="a14">
+      <mc:AlternateContent xmlns:mc="http://schemas.openxmlformats.org/markup-compatibility/2006" xmlns:a14="http://schemas.microsoft.com/office/drawing/2010/main">
+        <mc:Choice Requires="a14">
           <p:sp>
             <p:nvSpPr>
               <p:cNvPr id="18" name="Oval 17">
@@ -8465,11 +8565,12 @@
                     </m:oMath>
                   </m:oMathPara>
                 </a14:m>
+                <a:endParaRPr/>
               </a:p>
             </p:txBody>
           </p:sp>
         </mc:Choice>
-        <mc:Fallback>
+        <mc:Fallback xmlns="">
           <p:sp>
             <p:nvSpPr>
               <p:cNvPr id="18" name="Oval 17">
@@ -8522,8 +8623,8 @@
           </p:sp>
         </mc:Fallback>
       </mc:AlternateContent>
-      <mc:AlternateContent xmlns:mc="http://schemas.openxmlformats.org/markup-compatibility/2006">
-        <mc:Choice xmlns:a14="http://schemas.microsoft.com/office/drawing/2010/main" Requires="a14">
+      <mc:AlternateContent xmlns:mc="http://schemas.openxmlformats.org/markup-compatibility/2006" xmlns:a14="http://schemas.microsoft.com/office/drawing/2010/main">
+        <mc:Choice Requires="a14">
           <p:sp>
             <p:nvSpPr>
               <p:cNvPr id="16" name="Freeform: Shape 15">
@@ -8659,12 +8760,12 @@
               <a:lstStyle/>
               <a:p>
                 <a:pPr algn="ctr"/>
-                <a14:m/>
+                <a:endParaRPr/>
               </a:p>
             </p:txBody>
           </p:sp>
         </mc:Choice>
-        <mc:Fallback>
+        <mc:Fallback xmlns="">
           <p:sp>
             <p:nvSpPr>
               <p:cNvPr id="16" name="Freeform: Shape 15">
@@ -8998,8 +9099,8 @@
           </a:p>
         </p:txBody>
       </p:sp>
-      <mc:AlternateContent xmlns:mc="http://schemas.openxmlformats.org/markup-compatibility/2006">
-        <mc:Choice xmlns:a14="http://schemas.microsoft.com/office/drawing/2010/main" Requires="a14">
+      <mc:AlternateContent xmlns:mc="http://schemas.openxmlformats.org/markup-compatibility/2006" xmlns:a14="http://schemas.microsoft.com/office/drawing/2010/main">
+        <mc:Choice Requires="a14">
           <p:sp>
             <p:nvSpPr>
               <p:cNvPr id="3" name="Content Placeholder 2">
@@ -9222,7 +9323,7 @@
             </p:txBody>
           </p:sp>
         </mc:Choice>
-        <mc:Fallback>
+        <mc:Fallback xmlns="">
           <p:sp>
             <p:nvSpPr>
               <p:cNvPr id="3" name="Content Placeholder 2">
@@ -9333,8 +9434,8 @@
           </a:p>
         </p:txBody>
       </p:sp>
-      <mc:AlternateContent xmlns:mc="http://schemas.openxmlformats.org/markup-compatibility/2006">
-        <mc:Choice xmlns:a14="http://schemas.microsoft.com/office/drawing/2010/main" Requires="a14">
+      <mc:AlternateContent xmlns:mc="http://schemas.openxmlformats.org/markup-compatibility/2006" xmlns:a14="http://schemas.microsoft.com/office/drawing/2010/main">
+        <mc:Choice Requires="a14">
           <p:sp>
             <p:nvSpPr>
               <p:cNvPr id="3" name="Content Placeholder 2">
@@ -9681,7 +9782,7 @@
             </p:txBody>
           </p:sp>
         </mc:Choice>
-        <mc:Fallback>
+        <mc:Fallback xmlns="">
           <p:sp>
             <p:nvSpPr>
               <p:cNvPr id="3" name="Content Placeholder 2">
@@ -9725,8 +9826,8 @@
           </p:sp>
         </mc:Fallback>
       </mc:AlternateContent>
-      <mc:AlternateContent xmlns:mc="http://schemas.openxmlformats.org/markup-compatibility/2006">
-        <mc:Choice xmlns:a14="http://schemas.microsoft.com/office/drawing/2010/main" Requires="a14">
+      <mc:AlternateContent xmlns:mc="http://schemas.openxmlformats.org/markup-compatibility/2006" xmlns:a14="http://schemas.microsoft.com/office/drawing/2010/main">
+        <mc:Choice Requires="a14">
           <p:sp>
             <p:nvSpPr>
               <p:cNvPr id="4" name="TextBox 3">
@@ -9755,6 +9856,7 @@
               </a:bodyPr>
               <a:lstStyle/>
               <a:p>
+                <a:pPr/>
                 <a14:m>
                   <m:oMathPara xmlns:m="http://schemas.openxmlformats.org/officeDocument/2006/math">
                     <m:oMathParaPr>
@@ -9787,7 +9889,7 @@
             </p:txBody>
           </p:sp>
         </mc:Choice>
-        <mc:Fallback>
+        <mc:Fallback xmlns="">
           <p:sp>
             <p:nvSpPr>
               <p:cNvPr id="4" name="TextBox 3">
@@ -9832,8 +9934,8 @@
           </p:sp>
         </mc:Fallback>
       </mc:AlternateContent>
-      <mc:AlternateContent xmlns:mc="http://schemas.openxmlformats.org/markup-compatibility/2006">
-        <mc:Choice xmlns:a14="http://schemas.microsoft.com/office/drawing/2010/main" Requires="a14">
+      <mc:AlternateContent xmlns:mc="http://schemas.openxmlformats.org/markup-compatibility/2006" xmlns:a14="http://schemas.microsoft.com/office/drawing/2010/main">
+        <mc:Choice Requires="a14">
           <p:sp>
             <p:nvSpPr>
               <p:cNvPr id="5" name="TextBox 4">
@@ -9862,6 +9964,7 @@
               </a:bodyPr>
               <a:lstStyle/>
               <a:p>
+                <a:pPr/>
                 <a14:m>
                   <m:oMathPara xmlns:m="http://schemas.openxmlformats.org/officeDocument/2006/math">
                     <m:oMathParaPr>
@@ -9888,7 +9991,7 @@
             </p:txBody>
           </p:sp>
         </mc:Choice>
-        <mc:Fallback>
+        <mc:Fallback xmlns="">
           <p:sp>
             <p:nvSpPr>
               <p:cNvPr id="5" name="TextBox 4">
@@ -9933,8 +10036,8 @@
           </p:sp>
         </mc:Fallback>
       </mc:AlternateContent>
-      <mc:AlternateContent xmlns:mc="http://schemas.openxmlformats.org/markup-compatibility/2006">
-        <mc:Choice xmlns:a14="http://schemas.microsoft.com/office/drawing/2010/main" Requires="a14">
+      <mc:AlternateContent xmlns:mc="http://schemas.openxmlformats.org/markup-compatibility/2006" xmlns:a14="http://schemas.microsoft.com/office/drawing/2010/main">
+        <mc:Choice Requires="a14">
           <p:sp>
             <p:nvSpPr>
               <p:cNvPr id="7" name="TextBox 6">
@@ -9963,6 +10066,7 @@
               </a:bodyPr>
               <a:lstStyle/>
               <a:p>
+                <a:pPr/>
                 <a14:m>
                   <m:oMathPara xmlns:m="http://schemas.openxmlformats.org/officeDocument/2006/math">
                     <m:oMathParaPr>
@@ -10173,7 +10277,7 @@
             </p:txBody>
           </p:sp>
         </mc:Choice>
-        <mc:Fallback>
+        <mc:Fallback xmlns="">
           <p:sp>
             <p:nvSpPr>
               <p:cNvPr id="7" name="TextBox 6">
@@ -10218,8 +10322,8 @@
           </p:sp>
         </mc:Fallback>
       </mc:AlternateContent>
-      <mc:AlternateContent xmlns:mc="http://schemas.openxmlformats.org/markup-compatibility/2006">
-        <mc:Choice xmlns:a14="http://schemas.microsoft.com/office/drawing/2010/main" Requires="a14">
+      <mc:AlternateContent xmlns:mc="http://schemas.openxmlformats.org/markup-compatibility/2006" xmlns:a14="http://schemas.microsoft.com/office/drawing/2010/main">
+        <mc:Choice Requires="a14">
           <p:sp>
             <p:nvSpPr>
               <p:cNvPr id="8" name="TextBox 7">
@@ -10248,6 +10352,7 @@
               </a:bodyPr>
               <a:lstStyle/>
               <a:p>
+                <a:pPr/>
                 <a14:m>
                   <m:oMathPara xmlns:m="http://schemas.openxmlformats.org/officeDocument/2006/math">
                     <m:oMathParaPr>
@@ -10306,13 +10411,7 @@
                             <a:rPr lang="en-US" sz="2800" b="0" i="1" smtClean="0">
                               <a:latin typeface="Cambria Math" panose="02040503050406030204" pitchFamily="18" charset="0"/>
                             </a:rPr>
-                            <m:t>1,</m:t>
-                          </m:r>
-                          <m:r>
-                            <a:rPr lang="en-US" sz="2800" b="0" i="1" smtClean="0">
-                              <a:latin typeface="Cambria Math" panose="02040503050406030204" pitchFamily="18" charset="0"/>
-                            </a:rPr>
-                            <m:t>2</m:t>
+                            <m:t>1,2</m:t>
                           </m:r>
                         </m:e>
                       </m:d>
@@ -10473,7 +10572,7 @@
             </p:txBody>
           </p:sp>
         </mc:Choice>
-        <mc:Fallback>
+        <mc:Fallback xmlns="">
           <p:sp>
             <p:nvSpPr>
               <p:cNvPr id="8" name="TextBox 7">
@@ -11017,8 +11116,8 @@
           </p:pic>
         </mc:Fallback>
       </mc:AlternateContent>
-      <mc:AlternateContent xmlns:mc="http://schemas.openxmlformats.org/markup-compatibility/2006">
-        <mc:Choice xmlns:a14="http://schemas.microsoft.com/office/drawing/2010/main" Requires="a14">
+      <mc:AlternateContent xmlns:mc="http://schemas.openxmlformats.org/markup-compatibility/2006" xmlns:a14="http://schemas.microsoft.com/office/drawing/2010/main">
+        <mc:Choice Requires="a14">
           <p:sp>
             <p:nvSpPr>
               <p:cNvPr id="14" name="TextBox 13">
@@ -11047,6 +11146,7 @@
               </a:bodyPr>
               <a:lstStyle/>
               <a:p>
+                <a:pPr/>
                 <a14:m>
                   <m:oMathPara xmlns:m="http://schemas.openxmlformats.org/officeDocument/2006/math">
                     <m:oMathParaPr>
@@ -11062,11 +11162,12 @@
                     </m:oMath>
                   </m:oMathPara>
                 </a14:m>
+                <a:endParaRPr/>
               </a:p>
             </p:txBody>
           </p:sp>
         </mc:Choice>
-        <mc:Fallback>
+        <mc:Fallback xmlns="">
           <p:sp>
             <p:nvSpPr>
               <p:cNvPr id="14" name="TextBox 13">
@@ -11111,8 +11212,8 @@
           </p:sp>
         </mc:Fallback>
       </mc:AlternateContent>
-      <mc:AlternateContent xmlns:mc="http://schemas.openxmlformats.org/markup-compatibility/2006">
-        <mc:Choice xmlns:a14="http://schemas.microsoft.com/office/drawing/2010/main" Requires="a14">
+      <mc:AlternateContent xmlns:mc="http://schemas.openxmlformats.org/markup-compatibility/2006" xmlns:a14="http://schemas.microsoft.com/office/drawing/2010/main">
+        <mc:Choice Requires="a14">
           <p:sp>
             <p:nvSpPr>
               <p:cNvPr id="15" name="TextBox 14">
@@ -11141,6 +11242,7 @@
               </a:bodyPr>
               <a:lstStyle/>
               <a:p>
+                <a:pPr/>
                 <a14:m>
                   <m:oMathPara xmlns:m="http://schemas.openxmlformats.org/officeDocument/2006/math">
                     <m:oMathParaPr>
@@ -11156,11 +11258,12 @@
                     </m:oMath>
                   </m:oMathPara>
                 </a14:m>
+                <a:endParaRPr/>
               </a:p>
             </p:txBody>
           </p:sp>
         </mc:Choice>
-        <mc:Fallback>
+        <mc:Fallback xmlns="">
           <p:sp>
             <p:nvSpPr>
               <p:cNvPr id="15" name="TextBox 14">
@@ -11205,8 +11308,8 @@
           </p:sp>
         </mc:Fallback>
       </mc:AlternateContent>
-      <mc:AlternateContent xmlns:mc="http://schemas.openxmlformats.org/markup-compatibility/2006">
-        <mc:Choice xmlns:a14="http://schemas.microsoft.com/office/drawing/2010/main" Requires="a14">
+      <mc:AlternateContent xmlns:mc="http://schemas.openxmlformats.org/markup-compatibility/2006" xmlns:a14="http://schemas.microsoft.com/office/drawing/2010/main">
+        <mc:Choice Requires="a14">
           <p:sp>
             <p:nvSpPr>
               <p:cNvPr id="16" name="TextBox 15">
@@ -11235,6 +11338,7 @@
               </a:bodyPr>
               <a:lstStyle/>
               <a:p>
+                <a:pPr/>
                 <a14:m>
                   <m:oMathPara xmlns:m="http://schemas.openxmlformats.org/officeDocument/2006/math">
                     <m:oMathParaPr>
@@ -11262,11 +11366,12 @@
                     </m:oMath>
                   </m:oMathPara>
                 </a14:m>
+                <a:endParaRPr/>
               </a:p>
             </p:txBody>
           </p:sp>
         </mc:Choice>
-        <mc:Fallback>
+        <mc:Fallback xmlns="">
           <p:sp>
             <p:nvSpPr>
               <p:cNvPr id="16" name="TextBox 15">
@@ -11674,8 +11779,8 @@
           </a:p>
         </p:txBody>
       </p:sp>
-      <mc:AlternateContent xmlns:mc="http://schemas.openxmlformats.org/markup-compatibility/2006">
-        <mc:Choice xmlns:a14="http://schemas.microsoft.com/office/drawing/2010/main" Requires="a14">
+      <mc:AlternateContent xmlns:mc="http://schemas.openxmlformats.org/markup-compatibility/2006" xmlns:a14="http://schemas.microsoft.com/office/drawing/2010/main">
+        <mc:Choice Requires="a14">
           <p:sp>
             <p:nvSpPr>
               <p:cNvPr id="3" name="Content Placeholder 14">
@@ -11972,7 +12077,7 @@
             </p:txBody>
           </p:sp>
         </mc:Choice>
-        <mc:Fallback>
+        <mc:Fallback xmlns="">
           <p:sp>
             <p:nvSpPr>
               <p:cNvPr id="3" name="Content Placeholder 14">
@@ -12219,8 +12324,8 @@
           </a:p>
         </p:txBody>
       </p:sp>
-      <mc:AlternateContent xmlns:mc="http://schemas.openxmlformats.org/markup-compatibility/2006">
-        <mc:Choice xmlns:a14="http://schemas.microsoft.com/office/drawing/2010/main" Requires="a14">
+      <mc:AlternateContent xmlns:mc="http://schemas.openxmlformats.org/markup-compatibility/2006" xmlns:a14="http://schemas.microsoft.com/office/drawing/2010/main">
+        <mc:Choice Requires="a14">
           <p:sp>
             <p:nvSpPr>
               <p:cNvPr id="10" name="TextBox 9">
@@ -12249,6 +12354,7 @@
               </a:bodyPr>
               <a:lstStyle/>
               <a:p>
+                <a:pPr/>
                 <a14:m>
                   <m:oMathPara xmlns:m="http://schemas.openxmlformats.org/officeDocument/2006/math">
                     <m:oMathParaPr>
@@ -12281,7 +12387,7 @@
             </p:txBody>
           </p:sp>
         </mc:Choice>
-        <mc:Fallback>
+        <mc:Fallback xmlns="">
           <p:sp>
             <p:nvSpPr>
               <p:cNvPr id="10" name="TextBox 9">
@@ -12326,8 +12432,8 @@
           </p:sp>
         </mc:Fallback>
       </mc:AlternateContent>
-      <mc:AlternateContent xmlns:mc="http://schemas.openxmlformats.org/markup-compatibility/2006">
-        <mc:Choice xmlns:a14="http://schemas.microsoft.com/office/drawing/2010/main" Requires="a14">
+      <mc:AlternateContent xmlns:mc="http://schemas.openxmlformats.org/markup-compatibility/2006" xmlns:a14="http://schemas.microsoft.com/office/drawing/2010/main">
+        <mc:Choice Requires="a14">
           <p:sp>
             <p:nvSpPr>
               <p:cNvPr id="11" name="TextBox 10">
@@ -12356,6 +12462,7 @@
               </a:bodyPr>
               <a:lstStyle/>
               <a:p>
+                <a:pPr/>
                 <a14:m>
                   <m:oMathPara xmlns:m="http://schemas.openxmlformats.org/officeDocument/2006/math">
                     <m:oMathParaPr>
@@ -12439,7 +12546,7 @@
             </p:txBody>
           </p:sp>
         </mc:Choice>
-        <mc:Fallback>
+        <mc:Fallback xmlns="">
           <p:sp>
             <p:nvSpPr>
               <p:cNvPr id="11" name="TextBox 10">
@@ -12484,8 +12591,8 @@
           </p:sp>
         </mc:Fallback>
       </mc:AlternateContent>
-      <mc:AlternateContent xmlns:mc="http://schemas.openxmlformats.org/markup-compatibility/2006">
-        <mc:Choice xmlns:a14="http://schemas.microsoft.com/office/drawing/2010/main" Requires="a14">
+      <mc:AlternateContent xmlns:mc="http://schemas.openxmlformats.org/markup-compatibility/2006" xmlns:a14="http://schemas.microsoft.com/office/drawing/2010/main">
+        <mc:Choice Requires="a14">
           <p:sp>
             <p:nvSpPr>
               <p:cNvPr id="12" name="TextBox 11">
@@ -12514,6 +12621,7 @@
               </a:bodyPr>
               <a:lstStyle/>
               <a:p>
+                <a:pPr/>
                 <a14:m>
                   <m:oMathPara xmlns:m="http://schemas.openxmlformats.org/officeDocument/2006/math">
                     <m:oMathParaPr>
@@ -12736,7 +12844,7 @@
             </p:txBody>
           </p:sp>
         </mc:Choice>
-        <mc:Fallback>
+        <mc:Fallback xmlns="">
           <p:sp>
             <p:nvSpPr>
               <p:cNvPr id="12" name="TextBox 11">
@@ -13203,8 +13311,8 @@
           </a:p>
         </p:txBody>
       </p:sp>
-      <mc:AlternateContent xmlns:mc="http://schemas.openxmlformats.org/markup-compatibility/2006">
-        <mc:Choice xmlns:a14="http://schemas.microsoft.com/office/drawing/2010/main" Requires="a14">
+      <mc:AlternateContent xmlns:mc="http://schemas.openxmlformats.org/markup-compatibility/2006" xmlns:a14="http://schemas.microsoft.com/office/drawing/2010/main">
+        <mc:Choice Requires="a14">
           <p:sp>
             <p:nvSpPr>
               <p:cNvPr id="6" name="Oval 5">
@@ -13274,11 +13382,12 @@
                     </m:oMath>
                   </m:oMathPara>
                 </a14:m>
+                <a:endParaRPr/>
               </a:p>
             </p:txBody>
           </p:sp>
         </mc:Choice>
-        <mc:Fallback>
+        <mc:Fallback xmlns="">
           <p:sp>
             <p:nvSpPr>
               <p:cNvPr id="6" name="Oval 5">
@@ -13331,8 +13440,8 @@
           </p:sp>
         </mc:Fallback>
       </mc:AlternateContent>
-      <mc:AlternateContent xmlns:mc="http://schemas.openxmlformats.org/markup-compatibility/2006">
-        <mc:Choice xmlns:a14="http://schemas.microsoft.com/office/drawing/2010/main" Requires="a14">
+      <mc:AlternateContent xmlns:mc="http://schemas.openxmlformats.org/markup-compatibility/2006" xmlns:a14="http://schemas.microsoft.com/office/drawing/2010/main">
+        <mc:Choice Requires="a14">
           <p:sp>
             <p:nvSpPr>
               <p:cNvPr id="7" name="Oval 6">
@@ -13402,11 +13511,12 @@
                     </m:oMath>
                   </m:oMathPara>
                 </a14:m>
+                <a:endParaRPr/>
               </a:p>
             </p:txBody>
           </p:sp>
         </mc:Choice>
-        <mc:Fallback>
+        <mc:Fallback xmlns="">
           <p:sp>
             <p:nvSpPr>
               <p:cNvPr id="7" name="Oval 6">
@@ -13459,8 +13569,8 @@
           </p:sp>
         </mc:Fallback>
       </mc:AlternateContent>
-      <mc:AlternateContent xmlns:mc="http://schemas.openxmlformats.org/markup-compatibility/2006">
-        <mc:Choice xmlns:a14="http://schemas.microsoft.com/office/drawing/2010/main" Requires="a14">
+      <mc:AlternateContent xmlns:mc="http://schemas.openxmlformats.org/markup-compatibility/2006" xmlns:a14="http://schemas.microsoft.com/office/drawing/2010/main">
+        <mc:Choice Requires="a14">
           <p:sp>
             <p:nvSpPr>
               <p:cNvPr id="14" name="Oval 13">
@@ -13535,11 +13645,12 @@
                     </m:oMath>
                   </m:oMathPara>
                 </a14:m>
+                <a:endParaRPr/>
               </a:p>
             </p:txBody>
           </p:sp>
         </mc:Choice>
-        <mc:Fallback>
+        <mc:Fallback xmlns="">
           <p:sp>
             <p:nvSpPr>
               <p:cNvPr id="14" name="Oval 13">
@@ -13592,8 +13703,8 @@
           </p:sp>
         </mc:Fallback>
       </mc:AlternateContent>
-      <mc:AlternateContent xmlns:mc="http://schemas.openxmlformats.org/markup-compatibility/2006">
-        <mc:Choice xmlns:a14="http://schemas.microsoft.com/office/drawing/2010/main" Requires="a14">
+      <mc:AlternateContent xmlns:mc="http://schemas.openxmlformats.org/markup-compatibility/2006" xmlns:a14="http://schemas.microsoft.com/office/drawing/2010/main">
+        <mc:Choice Requires="a14">
           <p:sp>
             <p:nvSpPr>
               <p:cNvPr id="15" name="Oval 14">
@@ -13668,11 +13779,12 @@
                     </m:oMath>
                   </m:oMathPara>
                 </a14:m>
+                <a:endParaRPr/>
               </a:p>
             </p:txBody>
           </p:sp>
         </mc:Choice>
-        <mc:Fallback>
+        <mc:Fallback xmlns="">
           <p:sp>
             <p:nvSpPr>
               <p:cNvPr id="15" name="Oval 14">
@@ -13898,8 +14010,8 @@
           </a:p>
         </p:txBody>
       </p:sp>
-      <mc:AlternateContent xmlns:mc="http://schemas.openxmlformats.org/markup-compatibility/2006">
-        <mc:Choice xmlns:a14="http://schemas.microsoft.com/office/drawing/2010/main" Requires="a14">
+      <mc:AlternateContent xmlns:mc="http://schemas.openxmlformats.org/markup-compatibility/2006" xmlns:a14="http://schemas.microsoft.com/office/drawing/2010/main">
+        <mc:Choice Requires="a14">
           <p:sp>
             <p:nvSpPr>
               <p:cNvPr id="3" name="Content Placeholder 14">
@@ -14196,7 +14308,7 @@
             </p:txBody>
           </p:sp>
         </mc:Choice>
-        <mc:Fallback>
+        <mc:Fallback xmlns="">
           <p:sp>
             <p:nvSpPr>
               <p:cNvPr id="3" name="Content Placeholder 14">
@@ -14443,8 +14555,8 @@
           </a:p>
         </p:txBody>
       </p:sp>
-      <mc:AlternateContent xmlns:mc="http://schemas.openxmlformats.org/markup-compatibility/2006">
-        <mc:Choice xmlns:a14="http://schemas.microsoft.com/office/drawing/2010/main" Requires="a14">
+      <mc:AlternateContent xmlns:mc="http://schemas.openxmlformats.org/markup-compatibility/2006" xmlns:a14="http://schemas.microsoft.com/office/drawing/2010/main">
+        <mc:Choice Requires="a14">
           <p:sp>
             <p:nvSpPr>
               <p:cNvPr id="10" name="TextBox 9">
@@ -14500,7 +14612,7 @@
             </p:txBody>
           </p:sp>
         </mc:Choice>
-        <mc:Fallback>
+        <mc:Fallback xmlns="">
           <p:sp>
             <p:nvSpPr>
               <p:cNvPr id="10" name="TextBox 9">
@@ -14605,7 +14717,7 @@
                         <a:rPr lang="en-US" sz="2800" b="0" i="1" smtClean="0">
                           <a:latin typeface="Cambria Math" panose="02040503050406030204" pitchFamily="18" charset="0"/>
                         </a:rPr>
-                        <m:t>∪</m:t>
+                        <m:t>∩</m:t>
                       </m:r>
                       <m:d>
                         <m:dPr>
@@ -14685,7 +14797,7 @@
               <a:blipFill>
                 <a:blip r:embed="rId4"/>
                 <a:stretch>
-                  <a:fillRect/>
+                  <a:fillRect b="-5714"/>
                 </a:stretch>
               </a:blipFill>
             </p:spPr>
@@ -14720,8 +14832,8 @@
             </p:nvSpPr>
             <p:spPr>
               <a:xfrm>
-                <a:off x="2690516" y="5059024"/>
-                <a:ext cx="6826997" cy="1050224"/>
+                <a:off x="2682501" y="5059024"/>
+                <a:ext cx="6826997" cy="1050096"/>
               </a:xfrm>
               <a:prstGeom prst="rect">
                 <a:avLst/>
@@ -14743,7 +14855,7 @@
                     <m:oMath xmlns:m="http://schemas.openxmlformats.org/officeDocument/2006/math">
                       <m:nary>
                         <m:naryPr>
-                          <m:chr m:val="⋃"/>
+                          <m:chr m:val="⋂"/>
                           <m:subHide m:val="on"/>
                           <m:supHide m:val="on"/>
                           <m:ctrlPr>
@@ -14756,7 +14868,7 @@
                         <m:sup/>
                         <m:e>
                           <m:r>
-                            <a:rPr lang="en-US" sz="2800" b="0" i="1" smtClean="0">
+                            <a:rPr lang="en-US" sz="2800" i="1">
                               <a:latin typeface="Cambria Math" panose="02040503050406030204" pitchFamily="18" charset="0"/>
                             </a:rPr>
                             <m:t>𝐴</m:t>
@@ -14909,19 +15021,7 @@
                         <a:rPr lang="en-US" sz="2800" b="0" i="1" smtClean="0">
                           <a:latin typeface="Cambria Math" panose="02040503050406030204" pitchFamily="18" charset="0"/>
                         </a:rPr>
-                        <m:t>∩</m:t>
-                      </m:r>
-                      <m:r>
-                        <a:rPr lang="en-US" sz="2800" b="0" i="1" smtClean="0">
-                          <a:latin typeface="Cambria Math" panose="02040503050406030204" pitchFamily="18" charset="0"/>
-                        </a:rPr>
-                        <m:t>…</m:t>
-                      </m:r>
-                      <m:r>
-                        <a:rPr lang="en-US" sz="2800" b="0" i="1" smtClean="0">
-                          <a:latin typeface="Cambria Math" panose="02040503050406030204" pitchFamily="18" charset="0"/>
-                        </a:rPr>
-                        <m:t>∩</m:t>
+                        <m:t>∩…∩</m:t>
                       </m:r>
                       <m:sSub>
                         <m:sSubPr>
@@ -14986,8 +15086,8 @@
             </p:nvSpPr>
             <p:spPr>
               <a:xfrm>
-                <a:off x="2690516" y="5059024"/>
-                <a:ext cx="6826997" cy="1050224"/>
+                <a:off x="2682501" y="5059024"/>
+                <a:ext cx="6826997" cy="1050096"/>
               </a:xfrm>
               <a:prstGeom prst="rect">
                 <a:avLst/>
@@ -14995,7 +15095,7 @@
               <a:blipFill>
                 <a:blip r:embed="rId5"/>
                 <a:stretch>
-                  <a:fillRect/>
+                  <a:fillRect l="-19145" t="-149398" b="-207229"/>
                 </a:stretch>
               </a:blipFill>
             </p:spPr>
@@ -15436,8 +15536,8 @@
           </a:p>
         </p:txBody>
       </p:sp>
-      <mc:AlternateContent xmlns:mc="http://schemas.openxmlformats.org/markup-compatibility/2006">
-        <mc:Choice xmlns:a14="http://schemas.microsoft.com/office/drawing/2010/main" Requires="a14">
+      <mc:AlternateContent xmlns:mc="http://schemas.openxmlformats.org/markup-compatibility/2006" xmlns:a14="http://schemas.microsoft.com/office/drawing/2010/main">
+        <mc:Choice Requires="a14">
           <p:sp>
             <p:nvSpPr>
               <p:cNvPr id="6" name="Oval 5">
@@ -15507,11 +15607,12 @@
                     </m:oMath>
                   </m:oMathPara>
                 </a14:m>
+                <a:endParaRPr/>
               </a:p>
             </p:txBody>
           </p:sp>
         </mc:Choice>
-        <mc:Fallback>
+        <mc:Fallback xmlns="">
           <p:sp>
             <p:nvSpPr>
               <p:cNvPr id="6" name="Oval 5">
@@ -15564,8 +15665,8 @@
           </p:sp>
         </mc:Fallback>
       </mc:AlternateContent>
-      <mc:AlternateContent xmlns:mc="http://schemas.openxmlformats.org/markup-compatibility/2006">
-        <mc:Choice xmlns:a14="http://schemas.microsoft.com/office/drawing/2010/main" Requires="a14">
+      <mc:AlternateContent xmlns:mc="http://schemas.openxmlformats.org/markup-compatibility/2006" xmlns:a14="http://schemas.microsoft.com/office/drawing/2010/main">
+        <mc:Choice Requires="a14">
           <p:sp>
             <p:nvSpPr>
               <p:cNvPr id="7" name="Oval 6">
@@ -15635,11 +15736,12 @@
                     </m:oMath>
                   </m:oMathPara>
                 </a14:m>
+                <a:endParaRPr/>
               </a:p>
             </p:txBody>
           </p:sp>
         </mc:Choice>
-        <mc:Fallback>
+        <mc:Fallback xmlns="">
           <p:sp>
             <p:nvSpPr>
               <p:cNvPr id="7" name="Oval 6">
@@ -15692,8 +15794,8 @@
           </p:sp>
         </mc:Fallback>
       </mc:AlternateContent>
-      <mc:AlternateContent xmlns:mc="http://schemas.openxmlformats.org/markup-compatibility/2006">
-        <mc:Choice xmlns:a14="http://schemas.microsoft.com/office/drawing/2010/main" Requires="a14">
+      <mc:AlternateContent xmlns:mc="http://schemas.openxmlformats.org/markup-compatibility/2006" xmlns:a14="http://schemas.microsoft.com/office/drawing/2010/main">
+        <mc:Choice Requires="a14">
           <p:sp>
             <p:nvSpPr>
               <p:cNvPr id="14" name="Freeform: Shape 13">
@@ -15835,12 +15937,12 @@
               <a:lstStyle/>
               <a:p>
                 <a:pPr algn="ctr"/>
-                <a14:m/>
+                <a:endParaRPr/>
               </a:p>
             </p:txBody>
           </p:sp>
         </mc:Choice>
-        <mc:Fallback>
+        <mc:Fallback xmlns="">
           <p:sp>
             <p:nvSpPr>
               <p:cNvPr id="14" name="Freeform: Shape 13">
@@ -16121,8 +16223,8 @@
           </a:p>
         </p:txBody>
       </p:sp>
-      <mc:AlternateContent xmlns:mc="http://schemas.openxmlformats.org/markup-compatibility/2006">
-        <mc:Choice xmlns:a14="http://schemas.microsoft.com/office/drawing/2010/main" Requires="a14">
+      <mc:AlternateContent xmlns:mc="http://schemas.openxmlformats.org/markup-compatibility/2006" xmlns:a14="http://schemas.microsoft.com/office/drawing/2010/main">
+        <mc:Choice Requires="a14">
           <p:sp>
             <p:nvSpPr>
               <p:cNvPr id="3" name="Content Placeholder 2">
@@ -16226,7 +16328,7 @@
             </p:txBody>
           </p:sp>
         </mc:Choice>
-        <mc:Fallback>
+        <mc:Fallback xmlns="">
           <p:sp>
             <p:nvSpPr>
               <p:cNvPr id="3" name="Content Placeholder 2">
@@ -16270,8 +16372,8 @@
           </p:sp>
         </mc:Fallback>
       </mc:AlternateContent>
-      <mc:AlternateContent xmlns:mc="http://schemas.openxmlformats.org/markup-compatibility/2006">
-        <mc:Choice xmlns:a14="http://schemas.microsoft.com/office/drawing/2010/main" Requires="a14">
+      <mc:AlternateContent xmlns:mc="http://schemas.openxmlformats.org/markup-compatibility/2006" xmlns:a14="http://schemas.microsoft.com/office/drawing/2010/main">
+        <mc:Choice Requires="a14">
           <p:sp>
             <p:nvSpPr>
               <p:cNvPr id="8" name="TextBox 7">
@@ -16300,6 +16402,7 @@
               </a:bodyPr>
               <a:lstStyle/>
               <a:p>
+                <a:pPr/>
                 <a14:m>
                   <m:oMathPara xmlns:m="http://schemas.openxmlformats.org/officeDocument/2006/math">
                     <m:oMathParaPr>
@@ -16356,6 +16459,7 @@
                 </a:endParaRPr>
               </a:p>
               <a:p>
+                <a:pPr/>
                 <a14:m>
                   <m:oMathPara xmlns:m="http://schemas.openxmlformats.org/officeDocument/2006/math">
                     <m:oMathParaPr>
@@ -16412,7 +16516,7 @@
             </p:txBody>
           </p:sp>
         </mc:Choice>
-        <mc:Fallback>
+        <mc:Fallback xmlns="">
           <p:sp>
             <p:nvSpPr>
               <p:cNvPr id="8" name="TextBox 7">
@@ -16457,8 +16561,8 @@
           </p:sp>
         </mc:Fallback>
       </mc:AlternateContent>
-      <mc:AlternateContent xmlns:mc="http://schemas.openxmlformats.org/markup-compatibility/2006">
-        <mc:Choice xmlns:a14="http://schemas.microsoft.com/office/drawing/2010/main" Requires="a14">
+      <mc:AlternateContent xmlns:mc="http://schemas.openxmlformats.org/markup-compatibility/2006" xmlns:a14="http://schemas.microsoft.com/office/drawing/2010/main">
+        <mc:Choice Requires="a14">
           <p:sp>
             <p:nvSpPr>
               <p:cNvPr id="10" name="TextBox 9">
@@ -16487,6 +16591,7 @@
               </a:bodyPr>
               <a:lstStyle/>
               <a:p>
+                <a:pPr/>
                 <a14:m>
                   <m:oMathPara xmlns:m="http://schemas.openxmlformats.org/officeDocument/2006/math">
                     <m:oMathParaPr>
@@ -16587,6 +16692,7 @@
                 <a:endParaRPr lang="en-US" sz="2400" b="0" dirty="0"/>
               </a:p>
               <a:p>
+                <a:pPr/>
                 <a14:m>
                   <m:oMathPara xmlns:m="http://schemas.openxmlformats.org/officeDocument/2006/math">
                     <m:oMathParaPr>
@@ -16696,7 +16802,7 @@
             </p:txBody>
           </p:sp>
         </mc:Choice>
-        <mc:Fallback>
+        <mc:Fallback xmlns="">
           <p:sp>
             <p:nvSpPr>
               <p:cNvPr id="10" name="TextBox 9">
@@ -16741,8 +16847,8 @@
           </p:sp>
         </mc:Fallback>
       </mc:AlternateContent>
-      <mc:AlternateContent xmlns:mc="http://schemas.openxmlformats.org/markup-compatibility/2006">
-        <mc:Choice xmlns:a14="http://schemas.microsoft.com/office/drawing/2010/main" Requires="a14">
+      <mc:AlternateContent xmlns:mc="http://schemas.openxmlformats.org/markup-compatibility/2006" xmlns:a14="http://schemas.microsoft.com/office/drawing/2010/main">
+        <mc:Choice Requires="a14">
           <p:sp>
             <p:nvSpPr>
               <p:cNvPr id="12" name="TextBox 11">
@@ -16771,6 +16877,7 @@
               </a:bodyPr>
               <a:lstStyle/>
               <a:p>
+                <a:pPr/>
                 <a14:m>
                   <m:oMathPara xmlns:m="http://schemas.openxmlformats.org/officeDocument/2006/math">
                     <m:oMathParaPr>
@@ -16803,7 +16910,7 @@
             </p:txBody>
           </p:sp>
         </mc:Choice>
-        <mc:Fallback>
+        <mc:Fallback xmlns="">
           <p:sp>
             <p:nvSpPr>
               <p:cNvPr id="12" name="TextBox 11">
@@ -16848,8 +16955,8 @@
           </p:sp>
         </mc:Fallback>
       </mc:AlternateContent>
-      <mc:AlternateContent xmlns:mc="http://schemas.openxmlformats.org/markup-compatibility/2006">
-        <mc:Choice xmlns:a14="http://schemas.microsoft.com/office/drawing/2010/main" Requires="a14">
+      <mc:AlternateContent xmlns:mc="http://schemas.openxmlformats.org/markup-compatibility/2006" xmlns:a14="http://schemas.microsoft.com/office/drawing/2010/main">
+        <mc:Choice Requires="a14">
           <p:sp>
             <p:nvSpPr>
               <p:cNvPr id="14" name="TextBox 13">
@@ -16878,6 +16985,7 @@
               </a:bodyPr>
               <a:lstStyle/>
               <a:p>
+                <a:pPr/>
                 <a14:m>
                   <m:oMathPara xmlns:m="http://schemas.openxmlformats.org/officeDocument/2006/math">
                     <m:oMathParaPr>
@@ -17003,6 +17111,7 @@
                 </a:endParaRPr>
               </a:p>
               <a:p>
+                <a:pPr/>
                 <a14:m>
                   <m:oMathPara xmlns:m="http://schemas.openxmlformats.org/officeDocument/2006/math">
                     <m:oMathParaPr>
@@ -17128,7 +17237,7 @@
             </p:txBody>
           </p:sp>
         </mc:Choice>
-        <mc:Fallback>
+        <mc:Fallback xmlns="">
           <p:sp>
             <p:nvSpPr>
               <p:cNvPr id="14" name="TextBox 13">
@@ -17173,8 +17282,8 @@
           </p:sp>
         </mc:Fallback>
       </mc:AlternateContent>
-      <mc:AlternateContent xmlns:mc="http://schemas.openxmlformats.org/markup-compatibility/2006">
-        <mc:Choice xmlns:a14="http://schemas.microsoft.com/office/drawing/2010/main" Requires="a14">
+      <mc:AlternateContent xmlns:mc="http://schemas.openxmlformats.org/markup-compatibility/2006" xmlns:a14="http://schemas.microsoft.com/office/drawing/2010/main">
+        <mc:Choice Requires="a14">
           <p:sp>
             <p:nvSpPr>
               <p:cNvPr id="21" name="TextBox 20">
@@ -17230,7 +17339,7 @@
             </p:txBody>
           </p:sp>
         </mc:Choice>
-        <mc:Fallback>
+        <mc:Fallback xmlns="">
           <p:sp>
             <p:nvSpPr>
               <p:cNvPr id="21" name="TextBox 20">
@@ -17844,8 +17953,8 @@
           </a:p>
         </p:txBody>
       </p:sp>
-      <mc:AlternateContent xmlns:mc="http://schemas.openxmlformats.org/markup-compatibility/2006">
-        <mc:Choice xmlns:a14="http://schemas.microsoft.com/office/drawing/2010/main" Requires="a14">
+      <mc:AlternateContent xmlns:mc="http://schemas.openxmlformats.org/markup-compatibility/2006" xmlns:a14="http://schemas.microsoft.com/office/drawing/2010/main">
+        <mc:Choice Requires="a14">
           <p:sp>
             <p:nvSpPr>
               <p:cNvPr id="3" name="Content Placeholder 2">
@@ -18098,7 +18207,7 @@
             </p:txBody>
           </p:sp>
         </mc:Choice>
-        <mc:Fallback>
+        <mc:Fallback xmlns="">
           <p:sp>
             <p:nvSpPr>
               <p:cNvPr id="3" name="Content Placeholder 2">
@@ -18138,8 +18247,8 @@
           </p:sp>
         </mc:Fallback>
       </mc:AlternateContent>
-      <mc:AlternateContent xmlns:mc="http://schemas.openxmlformats.org/markup-compatibility/2006">
-        <mc:Choice xmlns:a14="http://schemas.microsoft.com/office/drawing/2010/main" Requires="a14">
+      <mc:AlternateContent xmlns:mc="http://schemas.openxmlformats.org/markup-compatibility/2006" xmlns:a14="http://schemas.microsoft.com/office/drawing/2010/main">
+        <mc:Choice Requires="a14">
           <p:sp>
             <p:nvSpPr>
               <p:cNvPr id="4" name="TextBox 3">
@@ -18213,7 +18322,7 @@
             </p:txBody>
           </p:sp>
         </mc:Choice>
-        <mc:Fallback>
+        <mc:Fallback xmlns="">
           <p:sp>
             <p:nvSpPr>
               <p:cNvPr id="4" name="TextBox 3">
@@ -18258,8 +18367,8 @@
           </p:sp>
         </mc:Fallback>
       </mc:AlternateContent>
-      <mc:AlternateContent xmlns:mc="http://schemas.openxmlformats.org/markup-compatibility/2006">
-        <mc:Choice xmlns:a14="http://schemas.microsoft.com/office/drawing/2010/main" Requires="a14">
+      <mc:AlternateContent xmlns:mc="http://schemas.openxmlformats.org/markup-compatibility/2006" xmlns:a14="http://schemas.microsoft.com/office/drawing/2010/main">
+        <mc:Choice Requires="a14">
           <p:sp>
             <p:nvSpPr>
               <p:cNvPr id="5" name="TextBox 4">
@@ -18315,7 +18424,7 @@
             </p:txBody>
           </p:sp>
         </mc:Choice>
-        <mc:Fallback>
+        <mc:Fallback xmlns="">
           <p:sp>
             <p:nvSpPr>
               <p:cNvPr id="5" name="TextBox 4">
@@ -18360,8 +18469,8 @@
           </p:sp>
         </mc:Fallback>
       </mc:AlternateContent>
-      <mc:AlternateContent xmlns:mc="http://schemas.openxmlformats.org/markup-compatibility/2006">
-        <mc:Choice xmlns:a14="http://schemas.microsoft.com/office/drawing/2010/main" Requires="a14">
+      <mc:AlternateContent xmlns:mc="http://schemas.openxmlformats.org/markup-compatibility/2006" xmlns:a14="http://schemas.microsoft.com/office/drawing/2010/main">
+        <mc:Choice Requires="a14">
           <p:sp>
             <p:nvSpPr>
               <p:cNvPr id="6" name="TextBox 5">
@@ -18417,7 +18526,7 @@
             </p:txBody>
           </p:sp>
         </mc:Choice>
-        <mc:Fallback>
+        <mc:Fallback xmlns="">
           <p:sp>
             <p:nvSpPr>
               <p:cNvPr id="6" name="TextBox 5">
@@ -18462,8 +18571,8 @@
           </p:sp>
         </mc:Fallback>
       </mc:AlternateContent>
-      <mc:AlternateContent xmlns:mc="http://schemas.openxmlformats.org/markup-compatibility/2006">
-        <mc:Choice xmlns:a14="http://schemas.microsoft.com/office/drawing/2010/main" Requires="a14">
+      <mc:AlternateContent xmlns:mc="http://schemas.openxmlformats.org/markup-compatibility/2006" xmlns:a14="http://schemas.microsoft.com/office/drawing/2010/main">
+        <mc:Choice Requires="a14">
           <p:sp>
             <p:nvSpPr>
               <p:cNvPr id="7" name="TextBox 6">
@@ -18537,7 +18646,7 @@
             </p:txBody>
           </p:sp>
         </mc:Choice>
-        <mc:Fallback>
+        <mc:Fallback xmlns="">
           <p:sp>
             <p:nvSpPr>
               <p:cNvPr id="7" name="TextBox 6">
@@ -19108,8 +19217,8 @@
           </a:p>
         </p:txBody>
       </p:sp>
-      <mc:AlternateContent xmlns:mc="http://schemas.openxmlformats.org/markup-compatibility/2006">
-        <mc:Choice xmlns:a14="http://schemas.microsoft.com/office/drawing/2010/main" Requires="a14">
+      <mc:AlternateContent xmlns:mc="http://schemas.openxmlformats.org/markup-compatibility/2006" xmlns:a14="http://schemas.microsoft.com/office/drawing/2010/main">
+        <mc:Choice Requires="a14">
           <p:sp>
             <p:nvSpPr>
               <p:cNvPr id="3" name="Content Placeholder 2">
@@ -19563,7 +19672,7 @@
             </p:txBody>
           </p:sp>
         </mc:Choice>
-        <mc:Fallback>
+        <mc:Fallback xmlns="">
           <p:sp>
             <p:nvSpPr>
               <p:cNvPr id="3" name="Content Placeholder 2">
@@ -19607,8 +19716,8 @@
           </p:sp>
         </mc:Fallback>
       </mc:AlternateContent>
-      <mc:AlternateContent xmlns:mc="http://schemas.openxmlformats.org/markup-compatibility/2006">
-        <mc:Choice xmlns:a14="http://schemas.microsoft.com/office/drawing/2010/main" Requires="a14">
+      <mc:AlternateContent xmlns:mc="http://schemas.openxmlformats.org/markup-compatibility/2006" xmlns:a14="http://schemas.microsoft.com/office/drawing/2010/main">
+        <mc:Choice Requires="a14">
           <p:sp>
             <p:nvSpPr>
               <p:cNvPr id="4" name="TextBox 3">
@@ -19703,7 +19812,7 @@
             </p:txBody>
           </p:sp>
         </mc:Choice>
-        <mc:Fallback>
+        <mc:Fallback xmlns="">
           <p:sp>
             <p:nvSpPr>
               <p:cNvPr id="4" name="TextBox 3">
@@ -19748,8 +19857,8 @@
           </p:sp>
         </mc:Fallback>
       </mc:AlternateContent>
-      <mc:AlternateContent xmlns:mc="http://schemas.openxmlformats.org/markup-compatibility/2006">
-        <mc:Choice xmlns:a14="http://schemas.microsoft.com/office/drawing/2010/main" Requires="a14">
+      <mc:AlternateContent xmlns:mc="http://schemas.openxmlformats.org/markup-compatibility/2006" xmlns:a14="http://schemas.microsoft.com/office/drawing/2010/main">
+        <mc:Choice Requires="a14">
           <p:sp>
             <p:nvSpPr>
               <p:cNvPr id="5" name="TextBox 4">
@@ -19844,7 +19953,7 @@
             </p:txBody>
           </p:sp>
         </mc:Choice>
-        <mc:Fallback>
+        <mc:Fallback xmlns="">
           <p:sp>
             <p:nvSpPr>
               <p:cNvPr id="5" name="TextBox 4">

</xml_diff>